<commit_message>
Added link to the data and checkpoints
</commit_message>
<xml_diff>
--- a/cnn-tips-and-tricks.pptx
+++ b/cnn-tips-and-tricks.pptx
@@ -10,35 +10,36 @@
     <p:sldId id="291" r:id="rId4"/>
     <p:sldId id="266" r:id="rId5"/>
     <p:sldId id="258" r:id="rId6"/>
-    <p:sldId id="259" r:id="rId7"/>
-    <p:sldId id="292" r:id="rId8"/>
-    <p:sldId id="260" r:id="rId9"/>
-    <p:sldId id="267" r:id="rId10"/>
-    <p:sldId id="261" r:id="rId11"/>
-    <p:sldId id="262" r:id="rId12"/>
-    <p:sldId id="264" r:id="rId13"/>
-    <p:sldId id="263" r:id="rId14"/>
-    <p:sldId id="265" r:id="rId15"/>
-    <p:sldId id="272" r:id="rId16"/>
-    <p:sldId id="268" r:id="rId17"/>
-    <p:sldId id="269" r:id="rId18"/>
-    <p:sldId id="270" r:id="rId19"/>
-    <p:sldId id="273" r:id="rId20"/>
-    <p:sldId id="277" r:id="rId21"/>
-    <p:sldId id="275" r:id="rId22"/>
-    <p:sldId id="278" r:id="rId23"/>
-    <p:sldId id="279" r:id="rId24"/>
-    <p:sldId id="289" r:id="rId25"/>
-    <p:sldId id="288" r:id="rId26"/>
-    <p:sldId id="280" r:id="rId27"/>
-    <p:sldId id="281" r:id="rId28"/>
-    <p:sldId id="283" r:id="rId29"/>
-    <p:sldId id="284" r:id="rId30"/>
-    <p:sldId id="290" r:id="rId31"/>
-    <p:sldId id="282" r:id="rId32"/>
-    <p:sldId id="293" r:id="rId33"/>
-    <p:sldId id="286" r:id="rId34"/>
-    <p:sldId id="287" r:id="rId35"/>
+    <p:sldId id="294" r:id="rId7"/>
+    <p:sldId id="259" r:id="rId8"/>
+    <p:sldId id="292" r:id="rId9"/>
+    <p:sldId id="260" r:id="rId10"/>
+    <p:sldId id="267" r:id="rId11"/>
+    <p:sldId id="261" r:id="rId12"/>
+    <p:sldId id="262" r:id="rId13"/>
+    <p:sldId id="264" r:id="rId14"/>
+    <p:sldId id="263" r:id="rId15"/>
+    <p:sldId id="265" r:id="rId16"/>
+    <p:sldId id="272" r:id="rId17"/>
+    <p:sldId id="268" r:id="rId18"/>
+    <p:sldId id="269" r:id="rId19"/>
+    <p:sldId id="270" r:id="rId20"/>
+    <p:sldId id="273" r:id="rId21"/>
+    <p:sldId id="277" r:id="rId22"/>
+    <p:sldId id="275" r:id="rId23"/>
+    <p:sldId id="278" r:id="rId24"/>
+    <p:sldId id="279" r:id="rId25"/>
+    <p:sldId id="289" r:id="rId26"/>
+    <p:sldId id="288" r:id="rId27"/>
+    <p:sldId id="280" r:id="rId28"/>
+    <p:sldId id="281" r:id="rId29"/>
+    <p:sldId id="283" r:id="rId30"/>
+    <p:sldId id="284" r:id="rId31"/>
+    <p:sldId id="290" r:id="rId32"/>
+    <p:sldId id="282" r:id="rId33"/>
+    <p:sldId id="293" r:id="rId34"/>
+    <p:sldId id="286" r:id="rId35"/>
+    <p:sldId id="287" r:id="rId36"/>
   </p:sldIdLst>
   <p:sldSz cx="12192000" cy="6858000"/>
   <p:notesSz cx="6858000" cy="9144000"/>
@@ -276,7 +277,7 @@
           <a:p>
             <a:fld id="{A122AF52-36FB-473A-95B1-935522EDF6B5}" type="datetimeFigureOut">
               <a:rPr lang="en-US" smtClean="0"/>
-              <a:t>9/14/2018</a:t>
+              <a:t>9/17/2018</a:t>
             </a:fld>
             <a:endParaRPr lang="en-US"/>
           </a:p>
@@ -446,7 +447,7 @@
           <a:p>
             <a:fld id="{A122AF52-36FB-473A-95B1-935522EDF6B5}" type="datetimeFigureOut">
               <a:rPr lang="en-US" smtClean="0"/>
-              <a:t>9/14/2018</a:t>
+              <a:t>9/17/2018</a:t>
             </a:fld>
             <a:endParaRPr lang="en-US"/>
           </a:p>
@@ -626,7 +627,7 @@
           <a:p>
             <a:fld id="{A122AF52-36FB-473A-95B1-935522EDF6B5}" type="datetimeFigureOut">
               <a:rPr lang="en-US" smtClean="0"/>
-              <a:t>9/14/2018</a:t>
+              <a:t>9/17/2018</a:t>
             </a:fld>
             <a:endParaRPr lang="en-US"/>
           </a:p>
@@ -796,7 +797,7 @@
           <a:p>
             <a:fld id="{A122AF52-36FB-473A-95B1-935522EDF6B5}" type="datetimeFigureOut">
               <a:rPr lang="en-US" smtClean="0"/>
-              <a:t>9/14/2018</a:t>
+              <a:t>9/17/2018</a:t>
             </a:fld>
             <a:endParaRPr lang="en-US"/>
           </a:p>
@@ -1042,7 +1043,7 @@
           <a:p>
             <a:fld id="{A122AF52-36FB-473A-95B1-935522EDF6B5}" type="datetimeFigureOut">
               <a:rPr lang="en-US" smtClean="0"/>
-              <a:t>9/14/2018</a:t>
+              <a:t>9/17/2018</a:t>
             </a:fld>
             <a:endParaRPr lang="en-US"/>
           </a:p>
@@ -1274,7 +1275,7 @@
           <a:p>
             <a:fld id="{A122AF52-36FB-473A-95B1-935522EDF6B5}" type="datetimeFigureOut">
               <a:rPr lang="en-US" smtClean="0"/>
-              <a:t>9/14/2018</a:t>
+              <a:t>9/17/2018</a:t>
             </a:fld>
             <a:endParaRPr lang="en-US"/>
           </a:p>
@@ -1641,7 +1642,7 @@
           <a:p>
             <a:fld id="{A122AF52-36FB-473A-95B1-935522EDF6B5}" type="datetimeFigureOut">
               <a:rPr lang="en-US" smtClean="0"/>
-              <a:t>9/14/2018</a:t>
+              <a:t>9/17/2018</a:t>
             </a:fld>
             <a:endParaRPr lang="en-US"/>
           </a:p>
@@ -1759,7 +1760,7 @@
           <a:p>
             <a:fld id="{A122AF52-36FB-473A-95B1-935522EDF6B5}" type="datetimeFigureOut">
               <a:rPr lang="en-US" smtClean="0"/>
-              <a:t>9/14/2018</a:t>
+              <a:t>9/17/2018</a:t>
             </a:fld>
             <a:endParaRPr lang="en-US"/>
           </a:p>
@@ -1854,7 +1855,7 @@
           <a:p>
             <a:fld id="{A122AF52-36FB-473A-95B1-935522EDF6B5}" type="datetimeFigureOut">
               <a:rPr lang="en-US" smtClean="0"/>
-              <a:t>9/14/2018</a:t>
+              <a:t>9/17/2018</a:t>
             </a:fld>
             <a:endParaRPr lang="en-US"/>
           </a:p>
@@ -2131,7 +2132,7 @@
           <a:p>
             <a:fld id="{A122AF52-36FB-473A-95B1-935522EDF6B5}" type="datetimeFigureOut">
               <a:rPr lang="en-US" smtClean="0"/>
-              <a:t>9/14/2018</a:t>
+              <a:t>9/17/2018</a:t>
             </a:fld>
             <a:endParaRPr lang="en-US"/>
           </a:p>
@@ -2384,7 +2385,7 @@
           <a:p>
             <a:fld id="{A122AF52-36FB-473A-95B1-935522EDF6B5}" type="datetimeFigureOut">
               <a:rPr lang="en-US" smtClean="0"/>
-              <a:t>9/14/2018</a:t>
+              <a:t>9/17/2018</a:t>
             </a:fld>
             <a:endParaRPr lang="en-US"/>
           </a:p>
@@ -2597,7 +2598,7 @@
           <a:p>
             <a:fld id="{A122AF52-36FB-473A-95B1-935522EDF6B5}" type="datetimeFigureOut">
               <a:rPr lang="en-US" smtClean="0"/>
-              <a:t>9/14/2018</a:t>
+              <a:t>9/17/2018</a:t>
             </a:fld>
             <a:endParaRPr lang="en-US"/>
           </a:p>
@@ -3097,6 +3098,93 @@
       </p:grpSpPr>
       <p:sp>
         <p:nvSpPr>
+          <p:cNvPr id="4" name="Title 3"/>
+          <p:cNvSpPr>
+            <a:spLocks noGrp="1"/>
+          </p:cNvSpPr>
+          <p:nvPr>
+            <p:ph type="title"/>
+          </p:nvPr>
+        </p:nvSpPr>
+        <p:spPr/>
+        <p:txBody>
+          <a:bodyPr/>
+          <a:lstStyle/>
+          <a:p>
+            <a:r>
+              <a:rPr lang="en-US" dirty="0" smtClean="0"/>
+              <a:t>Fine-tuning pre-trained CNN</a:t>
+            </a:r>
+            <a:endParaRPr lang="en-US" dirty="0"/>
+          </a:p>
+        </p:txBody>
+      </p:sp>
+      <p:sp>
+        <p:nvSpPr>
+          <p:cNvPr id="5" name="Text Placeholder 4"/>
+          <p:cNvSpPr>
+            <a:spLocks noGrp="1"/>
+          </p:cNvSpPr>
+          <p:nvPr>
+            <p:ph type="body" idx="1"/>
+          </p:nvPr>
+        </p:nvSpPr>
+        <p:spPr/>
+        <p:txBody>
+          <a:bodyPr/>
+          <a:lstStyle/>
+          <a:p>
+            <a:r>
+              <a:rPr lang="en-US" dirty="0" smtClean="0"/>
+              <a:t>fine-</a:t>
+            </a:r>
+            <a:r>
+              <a:rPr lang="en-US" dirty="0" err="1" smtClean="0"/>
+              <a:t>tuning.ipynb</a:t>
+            </a:r>
+            <a:endParaRPr lang="en-US" dirty="0"/>
+          </a:p>
+        </p:txBody>
+      </p:sp>
+    </p:spTree>
+    <p:extLst>
+      <p:ext uri="{BB962C8B-B14F-4D97-AF65-F5344CB8AC3E}">
+        <p14:creationId xmlns:p14="http://schemas.microsoft.com/office/powerpoint/2010/main" val="49459154"/>
+      </p:ext>
+    </p:extLst>
+  </p:cSld>
+  <p:clrMapOvr>
+    <a:masterClrMapping/>
+  </p:clrMapOvr>
+  <p:timing>
+    <p:tnLst>
+      <p:par>
+        <p:cTn id="1" dur="indefinite" restart="never" nodeType="tmRoot"/>
+      </p:par>
+    </p:tnLst>
+  </p:timing>
+</p:sld>
+</file>
+
+<file path=ppt/slides/slide11.xml><?xml version="1.0" encoding="utf-8"?>
+<p:sld xmlns:a="http://schemas.openxmlformats.org/drawingml/2006/main" xmlns:r="http://schemas.openxmlformats.org/officeDocument/2006/relationships" xmlns:p="http://schemas.openxmlformats.org/presentationml/2006/main">
+  <p:cSld>
+    <p:spTree>
+      <p:nvGrpSpPr>
+        <p:cNvPr id="1" name=""/>
+        <p:cNvGrpSpPr/>
+        <p:nvPr/>
+      </p:nvGrpSpPr>
+      <p:grpSpPr>
+        <a:xfrm>
+          <a:off x="0" y="0"/>
+          <a:ext cx="0" cy="0"/>
+          <a:chOff x="0" y="0"/>
+          <a:chExt cx="0" cy="0"/>
+        </a:xfrm>
+      </p:grpSpPr>
+      <p:sp>
+        <p:nvSpPr>
           <p:cNvPr id="2" name="Title 1"/>
           <p:cNvSpPr>
             <a:spLocks noGrp="1"/>
@@ -3205,7 +3293,7 @@
 </p:sld>
 </file>
 
-<file path=ppt/slides/slide11.xml><?xml version="1.0" encoding="utf-8"?>
+<file path=ppt/slides/slide12.xml><?xml version="1.0" encoding="utf-8"?>
 <p:sld xmlns:a="http://schemas.openxmlformats.org/drawingml/2006/main" xmlns:r="http://schemas.openxmlformats.org/officeDocument/2006/relationships" xmlns:p="http://schemas.openxmlformats.org/presentationml/2006/main">
   <p:cSld>
     <p:spTree>
@@ -3332,7 +3420,7 @@
 </p:sld>
 </file>
 
-<file path=ppt/slides/slide12.xml><?xml version="1.0" encoding="utf-8"?>
+<file path=ppt/slides/slide13.xml><?xml version="1.0" encoding="utf-8"?>
 <p:sld xmlns:a="http://schemas.openxmlformats.org/drawingml/2006/main" xmlns:r="http://schemas.openxmlformats.org/officeDocument/2006/relationships" xmlns:p="http://schemas.openxmlformats.org/presentationml/2006/main">
   <p:cSld>
     <p:spTree>
@@ -3455,7 +3543,7 @@
 </p:sld>
 </file>
 
-<file path=ppt/slides/slide13.xml><?xml version="1.0" encoding="utf-8"?>
+<file path=ppt/slides/slide14.xml><?xml version="1.0" encoding="utf-8"?>
 <p:sld xmlns:a="http://schemas.openxmlformats.org/drawingml/2006/main" xmlns:r="http://schemas.openxmlformats.org/officeDocument/2006/relationships" xmlns:p="http://schemas.openxmlformats.org/presentationml/2006/main">
   <p:cSld>
     <p:spTree>
@@ -3578,7 +3666,7 @@
 </p:sld>
 </file>
 
-<file path=ppt/slides/slide14.xml><?xml version="1.0" encoding="utf-8"?>
+<file path=ppt/slides/slide15.xml><?xml version="1.0" encoding="utf-8"?>
 <p:sld xmlns:a="http://schemas.openxmlformats.org/drawingml/2006/main" xmlns:r="http://schemas.openxmlformats.org/officeDocument/2006/relationships" xmlns:p="http://schemas.openxmlformats.org/presentationml/2006/main">
   <p:cSld>
     <p:spTree>
@@ -3701,7 +3789,7 @@
 </p:sld>
 </file>
 
-<file path=ppt/slides/slide15.xml><?xml version="1.0" encoding="utf-8"?>
+<file path=ppt/slides/slide16.xml><?xml version="1.0" encoding="utf-8"?>
 <p:sld xmlns:a="http://schemas.openxmlformats.org/drawingml/2006/main" xmlns:r="http://schemas.openxmlformats.org/officeDocument/2006/relationships" xmlns:p="http://schemas.openxmlformats.org/presentationml/2006/main">
   <p:cSld>
     <p:spTree>
@@ -3788,7 +3876,7 @@
 </p:sld>
 </file>
 
-<file path=ppt/slides/slide16.xml><?xml version="1.0" encoding="utf-8"?>
+<file path=ppt/slides/slide17.xml><?xml version="1.0" encoding="utf-8"?>
 <p:sld xmlns:a="http://schemas.openxmlformats.org/drawingml/2006/main" xmlns:r="http://schemas.openxmlformats.org/officeDocument/2006/relationships" xmlns:p="http://schemas.openxmlformats.org/presentationml/2006/main">
   <p:cSld>
     <p:spTree>
@@ -4054,7 +4142,7 @@
 </p:sld>
 </file>
 
-<file path=ppt/slides/slide17.xml><?xml version="1.0" encoding="utf-8"?>
+<file path=ppt/slides/slide18.xml><?xml version="1.0" encoding="utf-8"?>
 <p:sld xmlns:a="http://schemas.openxmlformats.org/drawingml/2006/main" xmlns:r="http://schemas.openxmlformats.org/officeDocument/2006/relationships" xmlns:p="http://schemas.openxmlformats.org/presentationml/2006/main">
   <p:cSld>
     <p:spTree>
@@ -4389,7 +4477,7 @@
 </p:sld>
 </file>
 
-<file path=ppt/slides/slide18.xml><?xml version="1.0" encoding="utf-8"?>
+<file path=ppt/slides/slide19.xml><?xml version="1.0" encoding="utf-8"?>
 <p:sld xmlns:a="http://schemas.openxmlformats.org/drawingml/2006/main" xmlns:r="http://schemas.openxmlformats.org/officeDocument/2006/relationships" xmlns:p="http://schemas.openxmlformats.org/presentationml/2006/main">
   <p:cSld>
     <p:spTree>
@@ -4562,7 +4650,165 @@
 </p:sld>
 </file>
 
-<file path=ppt/slides/slide19.xml><?xml version="1.0" encoding="utf-8"?>
+<file path=ppt/slides/slide2.xml><?xml version="1.0" encoding="utf-8"?>
+<p:sld xmlns:a="http://schemas.openxmlformats.org/drawingml/2006/main" xmlns:r="http://schemas.openxmlformats.org/officeDocument/2006/relationships" xmlns:p="http://schemas.openxmlformats.org/presentationml/2006/main">
+  <p:cSld>
+    <p:spTree>
+      <p:nvGrpSpPr>
+        <p:cNvPr id="1" name=""/>
+        <p:cNvGrpSpPr/>
+        <p:nvPr/>
+      </p:nvGrpSpPr>
+      <p:grpSpPr>
+        <a:xfrm>
+          <a:off x="0" y="0"/>
+          <a:ext cx="0" cy="0"/>
+          <a:chOff x="0" y="0"/>
+          <a:chExt cx="0" cy="0"/>
+        </a:xfrm>
+      </p:grpSpPr>
+      <p:sp>
+        <p:nvSpPr>
+          <p:cNvPr id="2" name="Title 1"/>
+          <p:cNvSpPr>
+            <a:spLocks noGrp="1"/>
+          </p:cNvSpPr>
+          <p:nvPr>
+            <p:ph type="title"/>
+          </p:nvPr>
+        </p:nvSpPr>
+        <p:spPr/>
+        <p:txBody>
+          <a:bodyPr/>
+          <a:lstStyle/>
+          <a:p>
+            <a:r>
+              <a:rPr lang="en-US" dirty="0" smtClean="0"/>
+              <a:t>Workshop setup</a:t>
+            </a:r>
+            <a:endParaRPr lang="en-US" dirty="0"/>
+          </a:p>
+        </p:txBody>
+      </p:sp>
+      <p:sp>
+        <p:nvSpPr>
+          <p:cNvPr id="3" name="Content Placeholder 2"/>
+          <p:cNvSpPr>
+            <a:spLocks noGrp="1"/>
+          </p:cNvSpPr>
+          <p:nvPr>
+            <p:ph idx="1"/>
+          </p:nvPr>
+        </p:nvSpPr>
+        <p:spPr/>
+        <p:txBody>
+          <a:bodyPr/>
+          <a:lstStyle/>
+          <a:p>
+            <a:pPr marL="514350" indent="-514350">
+              <a:buFont typeface="+mj-lt"/>
+              <a:buAutoNum type="arabicPeriod"/>
+            </a:pPr>
+            <a:r>
+              <a:rPr lang="en-US" dirty="0"/>
+              <a:t>Clone code from </a:t>
+            </a:r>
+            <a:r>
+              <a:rPr lang="en-US" dirty="0">
+                <a:hlinkClick r:id="rId2"/>
+              </a:rPr>
+              <a:t>https://</a:t>
+            </a:r>
+            <a:r>
+              <a:rPr lang="en-US" dirty="0" smtClean="0">
+                <a:hlinkClick r:id="rId2"/>
+              </a:rPr>
+              <a:t>github.com/hokmund/cnn-tips-and-tricks</a:t>
+            </a:r>
+            <a:endParaRPr lang="en-US" dirty="0" smtClean="0"/>
+          </a:p>
+          <a:p>
+            <a:pPr marL="514350" indent="-514350">
+              <a:buFont typeface="+mj-lt"/>
+              <a:buAutoNum type="arabicPeriod"/>
+            </a:pPr>
+            <a:r>
+              <a:rPr lang="en-US" dirty="0" smtClean="0"/>
+              <a:t>Download data and checkpoints from </a:t>
+            </a:r>
+            <a:r>
+              <a:rPr lang="en-US" u="sng" dirty="0">
+                <a:hlinkClick r:id="rId3"/>
+              </a:rPr>
+              <a:t>http://tiny.cc/4flryy</a:t>
+            </a:r>
+            <a:r>
+              <a:rPr lang="en-US" dirty="0"/>
+              <a:t> </a:t>
+            </a:r>
+            <a:endParaRPr lang="en-US" dirty="0" smtClean="0"/>
+          </a:p>
+          <a:p>
+            <a:pPr marL="514350" indent="-514350">
+              <a:buFont typeface="+mj-lt"/>
+              <a:buAutoNum type="arabicPeriod"/>
+            </a:pPr>
+            <a:r>
+              <a:rPr lang="en-US" dirty="0" smtClean="0"/>
+              <a:t>Extract them from the archive and place under </a:t>
+            </a:r>
+            <a:r>
+              <a:rPr lang="en-US" i="1" dirty="0" err="1" smtClean="0"/>
+              <a:t>src</a:t>
+            </a:r>
+            <a:r>
+              <a:rPr lang="en-US" i="1" dirty="0" smtClean="0"/>
+              <a:t>/ </a:t>
+            </a:r>
+            <a:r>
+              <a:rPr lang="en-US" dirty="0" smtClean="0"/>
+              <a:t>in the source code folder</a:t>
+            </a:r>
+            <a:endParaRPr lang="en-US" dirty="0" smtClean="0"/>
+          </a:p>
+          <a:p>
+            <a:pPr marL="514350" indent="-514350">
+              <a:buFont typeface="+mj-lt"/>
+              <a:buAutoNum type="arabicPeriod"/>
+            </a:pPr>
+            <a:r>
+              <a:rPr lang="en-US" dirty="0" smtClean="0"/>
+              <a:t>Run </a:t>
+            </a:r>
+            <a:r>
+              <a:rPr lang="en-US" i="1" dirty="0" smtClean="0"/>
+              <a:t>pip install –r requirements.txt</a:t>
+            </a:r>
+            <a:endParaRPr lang="en-US" i="1" dirty="0"/>
+          </a:p>
+        </p:txBody>
+      </p:sp>
+    </p:spTree>
+    <p:extLst>
+      <p:ext uri="{BB962C8B-B14F-4D97-AF65-F5344CB8AC3E}">
+        <p14:creationId xmlns:p14="http://schemas.microsoft.com/office/powerpoint/2010/main" val="419758280"/>
+      </p:ext>
+    </p:extLst>
+  </p:cSld>
+  <p:clrMapOvr>
+    <a:masterClrMapping/>
+  </p:clrMapOvr>
+  <p:timing>
+    <p:tnLst>
+      <p:par>
+        <p:cTn id="1" dur="indefinite" restart="never" nodeType="tmRoot"/>
+      </p:par>
+    </p:tnLst>
+  </p:timing>
+</p:sld>
+</file>
+
+<file path=ppt/slides/slide20.xml><?xml version="1.0" encoding="utf-8"?>
 <p:sld xmlns:a="http://schemas.openxmlformats.org/drawingml/2006/main" xmlns:r="http://schemas.openxmlformats.org/officeDocument/2006/relationships" xmlns:p="http://schemas.openxmlformats.org/presentationml/2006/main">
   <p:cSld>
     <p:spTree>
@@ -4763,149 +5009,7 @@
 </p:sld>
 </file>
 
-<file path=ppt/slides/slide2.xml><?xml version="1.0" encoding="utf-8"?>
-<p:sld xmlns:a="http://schemas.openxmlformats.org/drawingml/2006/main" xmlns:r="http://schemas.openxmlformats.org/officeDocument/2006/relationships" xmlns:p="http://schemas.openxmlformats.org/presentationml/2006/main">
-  <p:cSld>
-    <p:spTree>
-      <p:nvGrpSpPr>
-        <p:cNvPr id="1" name=""/>
-        <p:cNvGrpSpPr/>
-        <p:nvPr/>
-      </p:nvGrpSpPr>
-      <p:grpSpPr>
-        <a:xfrm>
-          <a:off x="0" y="0"/>
-          <a:ext cx="0" cy="0"/>
-          <a:chOff x="0" y="0"/>
-          <a:chExt cx="0" cy="0"/>
-        </a:xfrm>
-      </p:grpSpPr>
-      <p:sp>
-        <p:nvSpPr>
-          <p:cNvPr id="2" name="Title 1"/>
-          <p:cNvSpPr>
-            <a:spLocks noGrp="1"/>
-          </p:cNvSpPr>
-          <p:nvPr>
-            <p:ph type="title"/>
-          </p:nvPr>
-        </p:nvSpPr>
-        <p:spPr/>
-        <p:txBody>
-          <a:bodyPr/>
-          <a:lstStyle/>
-          <a:p>
-            <a:r>
-              <a:rPr lang="en-US" dirty="0" smtClean="0"/>
-              <a:t>Workshop setup</a:t>
-            </a:r>
-            <a:endParaRPr lang="en-US" dirty="0"/>
-          </a:p>
-        </p:txBody>
-      </p:sp>
-      <p:sp>
-        <p:nvSpPr>
-          <p:cNvPr id="3" name="Content Placeholder 2"/>
-          <p:cNvSpPr>
-            <a:spLocks noGrp="1"/>
-          </p:cNvSpPr>
-          <p:nvPr>
-            <p:ph idx="1"/>
-          </p:nvPr>
-        </p:nvSpPr>
-        <p:spPr/>
-        <p:txBody>
-          <a:bodyPr/>
-          <a:lstStyle/>
-          <a:p>
-            <a:pPr marL="514350" indent="-514350">
-              <a:buFont typeface="+mj-lt"/>
-              <a:buAutoNum type="arabicPeriod"/>
-            </a:pPr>
-            <a:r>
-              <a:rPr lang="en-US" dirty="0"/>
-              <a:t>Clone code from </a:t>
-            </a:r>
-            <a:r>
-              <a:rPr lang="en-US" dirty="0">
-                <a:hlinkClick r:id="rId2"/>
-              </a:rPr>
-              <a:t>https://</a:t>
-            </a:r>
-            <a:r>
-              <a:rPr lang="en-US" dirty="0" smtClean="0">
-                <a:hlinkClick r:id="rId2"/>
-              </a:rPr>
-              <a:t>github.com/hokmund/cnn-tips-and-tricks</a:t>
-            </a:r>
-            <a:endParaRPr lang="en-US" dirty="0" smtClean="0"/>
-          </a:p>
-          <a:p>
-            <a:pPr marL="514350" indent="-514350">
-              <a:buFont typeface="+mj-lt"/>
-              <a:buAutoNum type="arabicPeriod"/>
-            </a:pPr>
-            <a:r>
-              <a:rPr lang="en-US" dirty="0" smtClean="0"/>
-              <a:t>Download data and checkpoints from </a:t>
-            </a:r>
-          </a:p>
-          <a:p>
-            <a:pPr marL="514350" indent="-514350">
-              <a:buFont typeface="+mj-lt"/>
-              <a:buAutoNum type="arabicPeriod"/>
-            </a:pPr>
-            <a:r>
-              <a:rPr lang="en-US" dirty="0" smtClean="0"/>
-              <a:t>Extract them from the archive and place under </a:t>
-            </a:r>
-            <a:r>
-              <a:rPr lang="en-US" i="1" dirty="0" err="1" smtClean="0"/>
-              <a:t>src</a:t>
-            </a:r>
-            <a:r>
-              <a:rPr lang="en-US" i="1" dirty="0" smtClean="0"/>
-              <a:t>/</a:t>
-            </a:r>
-          </a:p>
-          <a:p>
-            <a:pPr marL="514350" indent="-514350">
-              <a:buFont typeface="+mj-lt"/>
-              <a:buAutoNum type="arabicPeriod"/>
-            </a:pPr>
-            <a:r>
-              <a:rPr lang="en-US" dirty="0" smtClean="0"/>
-              <a:t>Run </a:t>
-            </a:r>
-            <a:r>
-              <a:rPr lang="en-US" i="1" dirty="0" smtClean="0"/>
-              <a:t>pip install –r requirements.txt</a:t>
-            </a:r>
-            <a:endParaRPr lang="en-US" i="1" dirty="0"/>
-          </a:p>
-        </p:txBody>
-      </p:sp>
-    </p:spTree>
-    <p:extLst>
-      <p:ext uri="{BB962C8B-B14F-4D97-AF65-F5344CB8AC3E}">
-        <p14:creationId xmlns:p14="http://schemas.microsoft.com/office/powerpoint/2010/main" val="419758280"/>
-      </p:ext>
-    </p:extLst>
-  </p:cSld>
-  <p:clrMapOvr>
-    <a:masterClrMapping/>
-  </p:clrMapOvr>
-  <p:timing>
-    <p:tnLst>
-      <p:par>
-        <p:cTn id="1" dur="indefinite" restart="never" nodeType="tmRoot"/>
-      </p:par>
-    </p:tnLst>
-  </p:timing>
-</p:sld>
-</file>
-
-<file path=ppt/slides/slide20.xml><?xml version="1.0" encoding="utf-8"?>
+<file path=ppt/slides/slide21.xml><?xml version="1.0" encoding="utf-8"?>
 <p:sld xmlns:a="http://schemas.openxmlformats.org/drawingml/2006/main" xmlns:r="http://schemas.openxmlformats.org/officeDocument/2006/relationships" xmlns:p="http://schemas.openxmlformats.org/presentationml/2006/main">
   <p:cSld>
     <p:spTree>
@@ -5067,7 +5171,7 @@
 </p:sld>
 </file>
 
-<file path=ppt/slides/slide21.xml><?xml version="1.0" encoding="utf-8"?>
+<file path=ppt/slides/slide22.xml><?xml version="1.0" encoding="utf-8"?>
 <p:sld xmlns:a="http://schemas.openxmlformats.org/drawingml/2006/main" xmlns:r="http://schemas.openxmlformats.org/officeDocument/2006/relationships" xmlns:p="http://schemas.openxmlformats.org/presentationml/2006/main">
   <p:cSld>
     <p:spTree>
@@ -5154,7 +5258,7 @@
 </p:sld>
 </file>
 
-<file path=ppt/slides/slide22.xml><?xml version="1.0" encoding="utf-8"?>
+<file path=ppt/slides/slide23.xml><?xml version="1.0" encoding="utf-8"?>
 <p:sld xmlns:a="http://schemas.openxmlformats.org/drawingml/2006/main" xmlns:r="http://schemas.openxmlformats.org/officeDocument/2006/relationships" xmlns:p="http://schemas.openxmlformats.org/presentationml/2006/main">
   <p:cSld>
     <p:spTree>
@@ -5316,7 +5420,7 @@
 </p:sld>
 </file>
 
-<file path=ppt/slides/slide23.xml><?xml version="1.0" encoding="utf-8"?>
+<file path=ppt/slides/slide24.xml><?xml version="1.0" encoding="utf-8"?>
 <p:sld xmlns:a="http://schemas.openxmlformats.org/drawingml/2006/main" xmlns:r="http://schemas.openxmlformats.org/officeDocument/2006/relationships" xmlns:p="http://schemas.openxmlformats.org/presentationml/2006/main">
   <p:cSld>
     <p:spTree>
@@ -5403,7 +5507,7 @@
 </p:sld>
 </file>
 
-<file path=ppt/slides/slide24.xml><?xml version="1.0" encoding="utf-8"?>
+<file path=ppt/slides/slide25.xml><?xml version="1.0" encoding="utf-8"?>
 <p:sld xmlns:a="http://schemas.openxmlformats.org/drawingml/2006/main" xmlns:r="http://schemas.openxmlformats.org/officeDocument/2006/relationships" xmlns:p="http://schemas.openxmlformats.org/presentationml/2006/main">
   <p:cSld>
     <p:spTree>
@@ -5929,7 +6033,7 @@
 </p:sld>
 </file>
 
-<file path=ppt/slides/slide25.xml><?xml version="1.0" encoding="utf-8"?>
+<file path=ppt/slides/slide26.xml><?xml version="1.0" encoding="utf-8"?>
 <p:sld xmlns:a="http://schemas.openxmlformats.org/drawingml/2006/main" xmlns:r="http://schemas.openxmlformats.org/officeDocument/2006/relationships" xmlns:p="http://schemas.openxmlformats.org/presentationml/2006/main">
   <p:cSld>
     <p:spTree>
@@ -6016,7 +6120,7 @@
 </p:sld>
 </file>
 
-<file path=ppt/slides/slide26.xml><?xml version="1.0" encoding="utf-8"?>
+<file path=ppt/slides/slide27.xml><?xml version="1.0" encoding="utf-8"?>
 <p:sld xmlns:a="http://schemas.openxmlformats.org/drawingml/2006/main" xmlns:r="http://schemas.openxmlformats.org/officeDocument/2006/relationships" xmlns:p="http://schemas.openxmlformats.org/presentationml/2006/main">
   <p:cSld>
     <p:spTree>
@@ -6168,7 +6272,7 @@
 </p:sld>
 </file>
 
-<file path=ppt/slides/slide27.xml><?xml version="1.0" encoding="utf-8"?>
+<file path=ppt/slides/slide28.xml><?xml version="1.0" encoding="utf-8"?>
 <p:sld xmlns:a="http://schemas.openxmlformats.org/drawingml/2006/main" xmlns:r="http://schemas.openxmlformats.org/officeDocument/2006/relationships" xmlns:p="http://schemas.openxmlformats.org/presentationml/2006/main">
   <p:cSld>
     <p:spTree>
@@ -6258,7 +6362,7 @@
 </p:sld>
 </file>
 
-<file path=ppt/slides/slide28.xml><?xml version="1.0" encoding="utf-8"?>
+<file path=ppt/slides/slide29.xml><?xml version="1.0" encoding="utf-8"?>
 <p:sld xmlns:a="http://schemas.openxmlformats.org/drawingml/2006/main" xmlns:r="http://schemas.openxmlformats.org/officeDocument/2006/relationships" xmlns:p="http://schemas.openxmlformats.org/presentationml/2006/main">
   <p:cSld>
     <p:spTree>
@@ -6390,143 +6494,6 @@
 </p:sld>
 </file>
 
-<file path=ppt/slides/slide29.xml><?xml version="1.0" encoding="utf-8"?>
-<p:sld xmlns:a="http://schemas.openxmlformats.org/drawingml/2006/main" xmlns:r="http://schemas.openxmlformats.org/officeDocument/2006/relationships" xmlns:p="http://schemas.openxmlformats.org/presentationml/2006/main">
-  <p:cSld>
-    <p:spTree>
-      <p:nvGrpSpPr>
-        <p:cNvPr id="1" name=""/>
-        <p:cNvGrpSpPr/>
-        <p:nvPr/>
-      </p:nvGrpSpPr>
-      <p:grpSpPr>
-        <a:xfrm>
-          <a:off x="0" y="0"/>
-          <a:ext cx="0" cy="0"/>
-          <a:chOff x="0" y="0"/>
-          <a:chExt cx="0" cy="0"/>
-        </a:xfrm>
-      </p:grpSpPr>
-      <p:sp>
-        <p:nvSpPr>
-          <p:cNvPr id="2" name="Title 1"/>
-          <p:cNvSpPr>
-            <a:spLocks noGrp="1"/>
-          </p:cNvSpPr>
-          <p:nvPr>
-            <p:ph type="title"/>
-          </p:nvPr>
-        </p:nvSpPr>
-        <p:spPr/>
-        <p:txBody>
-          <a:bodyPr/>
-          <a:lstStyle/>
-          <a:p>
-            <a:r>
-              <a:rPr lang="en-US" dirty="0" err="1" smtClean="0"/>
-              <a:t>Pseudolabeling</a:t>
-            </a:r>
-            <a:endParaRPr lang="en-US" dirty="0"/>
-          </a:p>
-        </p:txBody>
-      </p:sp>
-      <p:sp>
-        <p:nvSpPr>
-          <p:cNvPr id="5" name="Content Placeholder 4"/>
-          <p:cNvSpPr>
-            <a:spLocks noGrp="1"/>
-          </p:cNvSpPr>
-          <p:nvPr>
-            <p:ph idx="1"/>
-          </p:nvPr>
-        </p:nvSpPr>
-        <p:spPr/>
-        <p:txBody>
-          <a:bodyPr>
-            <a:normAutofit/>
-          </a:bodyPr>
-          <a:lstStyle/>
-          <a:p>
-            <a:pPr marL="514350" indent="-514350">
-              <a:buFont typeface="+mj-lt"/>
-              <a:buAutoNum type="arabicPeriod"/>
-            </a:pPr>
-            <a:r>
-              <a:rPr lang="en-US" sz="3200" dirty="0" smtClean="0"/>
-              <a:t>Train classifier on the initial training set.</a:t>
-            </a:r>
-          </a:p>
-          <a:p>
-            <a:pPr marL="514350" indent="-514350">
-              <a:buFont typeface="+mj-lt"/>
-              <a:buAutoNum type="arabicPeriod"/>
-            </a:pPr>
-            <a:r>
-              <a:rPr lang="en-US" sz="3200" dirty="0" smtClean="0"/>
-              <a:t>Predict validation / test set with your classifier.</a:t>
-            </a:r>
-          </a:p>
-          <a:p>
-            <a:pPr marL="514350" indent="-514350">
-              <a:buFont typeface="+mj-lt"/>
-              <a:buAutoNum type="arabicPeriod"/>
-            </a:pPr>
-            <a:r>
-              <a:rPr lang="en-US" sz="3200" dirty="0" smtClean="0"/>
-              <a:t>Optional: remove images with low-confidence labels.</a:t>
-            </a:r>
-          </a:p>
-          <a:p>
-            <a:pPr marL="514350" indent="-514350">
-              <a:buFont typeface="+mj-lt"/>
-              <a:buAutoNum type="arabicPeriod"/>
-            </a:pPr>
-            <a:r>
-              <a:rPr lang="en-US" sz="3200" dirty="0" smtClean="0"/>
-              <a:t>Add </a:t>
-            </a:r>
-            <a:r>
-              <a:rPr lang="en-US" sz="3200" dirty="0" err="1" smtClean="0"/>
-              <a:t>pseudolabeled</a:t>
-            </a:r>
-            <a:r>
-              <a:rPr lang="en-US" sz="3200" dirty="0" smtClean="0"/>
-              <a:t> data to your training set.</a:t>
-            </a:r>
-          </a:p>
-          <a:p>
-            <a:pPr marL="514350" indent="-514350">
-              <a:buFont typeface="+mj-lt"/>
-              <a:buAutoNum type="arabicPeriod"/>
-            </a:pPr>
-            <a:r>
-              <a:rPr lang="en-US" sz="3200" dirty="0" smtClean="0"/>
-              <a:t>Use it to train CNN from scratch (some kind of a warmup) or to refine your previous classifier.</a:t>
-            </a:r>
-            <a:endParaRPr lang="en-US" sz="3200" dirty="0"/>
-          </a:p>
-        </p:txBody>
-      </p:sp>
-    </p:spTree>
-    <p:extLst>
-      <p:ext uri="{BB962C8B-B14F-4D97-AF65-F5344CB8AC3E}">
-        <p14:creationId xmlns:p14="http://schemas.microsoft.com/office/powerpoint/2010/main" val="3586073535"/>
-      </p:ext>
-    </p:extLst>
-  </p:cSld>
-  <p:clrMapOvr>
-    <a:masterClrMapping/>
-  </p:clrMapOvr>
-  <p:timing>
-    <p:tnLst>
-      <p:par>
-        <p:cTn id="1" dur="indefinite" restart="never" nodeType="tmRoot"/>
-      </p:par>
-    </p:tnLst>
-  </p:timing>
-</p:sld>
-</file>
-
 <file path=ppt/slides/slide3.xml><?xml version="1.0" encoding="utf-8"?>
 <p:sld xmlns:a="http://schemas.openxmlformats.org/drawingml/2006/main" xmlns:r="http://schemas.openxmlformats.org/officeDocument/2006/relationships" xmlns:p="http://schemas.openxmlformats.org/presentationml/2006/main">
   <p:cSld>
@@ -6681,6 +6648,13 @@
   <p:clrMapOvr>
     <a:masterClrMapping/>
   </p:clrMapOvr>
+  <p:timing>
+    <p:tnLst>
+      <p:par>
+        <p:cTn id="1" dur="indefinite" restart="never" nodeType="tmRoot"/>
+      </p:par>
+    </p:tnLst>
+  </p:timing>
 </p:sld>
 </file>
 
@@ -6720,14 +6694,6 @@
               <a:rPr lang="en-US" dirty="0" err="1" smtClean="0"/>
               <a:t>Pseudolabeling</a:t>
             </a:r>
-            <a:r>
-              <a:rPr lang="en-US" dirty="0"/>
-              <a:t> </a:t>
-            </a:r>
-            <a:r>
-              <a:rPr lang="en-US" dirty="0" smtClean="0"/>
-              <a:t>constraints</a:t>
-            </a:r>
             <a:endParaRPr lang="en-US" dirty="0"/>
           </a:p>
         </p:txBody>
@@ -6755,9 +6721,8 @@
             </a:pPr>
             <a:r>
               <a:rPr lang="en-US" sz="3200" dirty="0" smtClean="0"/>
-              <a:t>Test dataset has reasonable size (at least comparable to the training set).</a:t>
-            </a:r>
-            <a:endParaRPr lang="en-US" sz="2400" dirty="0" smtClean="0"/>
+              <a:t>Train classifier on the initial training set.</a:t>
+            </a:r>
           </a:p>
           <a:p>
             <a:pPr marL="514350" indent="-514350">
@@ -6766,23 +6731,7 @@
             </a:pPr>
             <a:r>
               <a:rPr lang="en-US" sz="3200" dirty="0" smtClean="0"/>
-              <a:t>Network which is trained on </a:t>
-            </a:r>
-            <a:r>
-              <a:rPr lang="en-US" sz="3200" dirty="0" err="1" smtClean="0"/>
-              <a:t>pseudolabels</a:t>
-            </a:r>
-            <a:r>
-              <a:rPr lang="en-US" sz="3200" dirty="0" smtClean="0"/>
-              <a:t> is deep enough (especially when </a:t>
-            </a:r>
-            <a:r>
-              <a:rPr lang="en-US" sz="3200" dirty="0" err="1" smtClean="0"/>
-              <a:t>pseudolabels</a:t>
-            </a:r>
-            <a:r>
-              <a:rPr lang="en-US" sz="3200" dirty="0" smtClean="0"/>
-              <a:t> are generated by an ensemble of models).</a:t>
+              <a:t>Predict validation / test set with your classifier.</a:t>
             </a:r>
           </a:p>
           <a:p>
@@ -6792,7 +6741,17 @@
             </a:pPr>
             <a:r>
               <a:rPr lang="en-US" sz="3200" dirty="0" smtClean="0"/>
-              <a:t>Training data and </a:t>
+              <a:t>Optional: remove images with low-confidence labels.</a:t>
+            </a:r>
+          </a:p>
+          <a:p>
+            <a:pPr marL="514350" indent="-514350">
+              <a:buFont typeface="+mj-lt"/>
+              <a:buAutoNum type="arabicPeriod"/>
+            </a:pPr>
+            <a:r>
+              <a:rPr lang="en-US" sz="3200" dirty="0" smtClean="0"/>
+              <a:t>Add </a:t>
             </a:r>
             <a:r>
               <a:rPr lang="en-US" sz="3200" dirty="0" err="1" smtClean="0"/>
@@ -6800,7 +6759,17 @@
             </a:r>
             <a:r>
               <a:rPr lang="en-US" sz="3200" dirty="0" smtClean="0"/>
-              <a:t> data are mixed in 1:2 – 1:4 proportions respectively.</a:t>
+              <a:t> data to your training set.</a:t>
+            </a:r>
+          </a:p>
+          <a:p>
+            <a:pPr marL="514350" indent="-514350">
+              <a:buFont typeface="+mj-lt"/>
+              <a:buAutoNum type="arabicPeriod"/>
+            </a:pPr>
+            <a:r>
+              <a:rPr lang="en-US" sz="3200" dirty="0" smtClean="0"/>
+              <a:t>Use it to train CNN from scratch (some kind of a warmup) or to refine your previous classifier.</a:t>
             </a:r>
             <a:endParaRPr lang="en-US" sz="3200" dirty="0"/>
           </a:p>
@@ -6809,7 +6778,7 @@
     </p:spTree>
     <p:extLst>
       <p:ext uri="{BB962C8B-B14F-4D97-AF65-F5344CB8AC3E}">
-        <p14:creationId xmlns:p14="http://schemas.microsoft.com/office/powerpoint/2010/main" val="2934982308"/>
+        <p14:creationId xmlns:p14="http://schemas.microsoft.com/office/powerpoint/2010/main" val="3586073535"/>
       </p:ext>
     </p:extLst>
   </p:cSld>
@@ -6862,37 +6831,96 @@
               <a:rPr lang="en-US" dirty="0" err="1" smtClean="0"/>
               <a:t>Pseudolabeling</a:t>
             </a:r>
+            <a:r>
+              <a:rPr lang="en-US" dirty="0"/>
+              <a:t> </a:t>
+            </a:r>
+            <a:r>
+              <a:rPr lang="en-US" dirty="0" smtClean="0"/>
+              <a:t>constraints</a:t>
+            </a:r>
             <a:endParaRPr lang="en-US" dirty="0"/>
           </a:p>
         </p:txBody>
       </p:sp>
       <p:sp>
         <p:nvSpPr>
-          <p:cNvPr id="4" name="Text Placeholder 5"/>
-          <p:cNvSpPr>
-            <a:spLocks noGrp="1"/>
-          </p:cNvSpPr>
-          <p:nvPr>
-            <p:ph type="body" idx="1"/>
-          </p:nvPr>
-        </p:nvSpPr>
-        <p:spPr/>
-        <p:txBody>
-          <a:bodyPr/>
-          <a:lstStyle/>
-          <a:p>
-            <a:r>
-              <a:rPr lang="en-US" dirty="0" err="1" smtClean="0"/>
-              <a:t>pseudolabeling.ipynb</a:t>
-            </a:r>
-            <a:endParaRPr lang="en-US" dirty="0"/>
+          <p:cNvPr id="5" name="Content Placeholder 4"/>
+          <p:cNvSpPr>
+            <a:spLocks noGrp="1"/>
+          </p:cNvSpPr>
+          <p:nvPr>
+            <p:ph idx="1"/>
+          </p:nvPr>
+        </p:nvSpPr>
+        <p:spPr/>
+        <p:txBody>
+          <a:bodyPr>
+            <a:normAutofit/>
+          </a:bodyPr>
+          <a:lstStyle/>
+          <a:p>
+            <a:pPr marL="514350" indent="-514350">
+              <a:buFont typeface="+mj-lt"/>
+              <a:buAutoNum type="arabicPeriod"/>
+            </a:pPr>
+            <a:r>
+              <a:rPr lang="en-US" sz="3200" dirty="0" smtClean="0"/>
+              <a:t>Test dataset has reasonable size (at least comparable to the training set).</a:t>
+            </a:r>
+            <a:endParaRPr lang="en-US" sz="2400" dirty="0" smtClean="0"/>
+          </a:p>
+          <a:p>
+            <a:pPr marL="514350" indent="-514350">
+              <a:buFont typeface="+mj-lt"/>
+              <a:buAutoNum type="arabicPeriod"/>
+            </a:pPr>
+            <a:r>
+              <a:rPr lang="en-US" sz="3200" dirty="0" smtClean="0"/>
+              <a:t>Network which is trained on </a:t>
+            </a:r>
+            <a:r>
+              <a:rPr lang="en-US" sz="3200" dirty="0" err="1" smtClean="0"/>
+              <a:t>pseudolabels</a:t>
+            </a:r>
+            <a:r>
+              <a:rPr lang="en-US" sz="3200" dirty="0" smtClean="0"/>
+              <a:t> is deep enough (especially when </a:t>
+            </a:r>
+            <a:r>
+              <a:rPr lang="en-US" sz="3200" dirty="0" err="1" smtClean="0"/>
+              <a:t>pseudolabels</a:t>
+            </a:r>
+            <a:r>
+              <a:rPr lang="en-US" sz="3200" dirty="0" smtClean="0"/>
+              <a:t> are generated by an ensemble of models).</a:t>
+            </a:r>
+          </a:p>
+          <a:p>
+            <a:pPr marL="514350" indent="-514350">
+              <a:buFont typeface="+mj-lt"/>
+              <a:buAutoNum type="arabicPeriod"/>
+            </a:pPr>
+            <a:r>
+              <a:rPr lang="en-US" sz="3200" dirty="0" smtClean="0"/>
+              <a:t>Training data and </a:t>
+            </a:r>
+            <a:r>
+              <a:rPr lang="en-US" sz="3200" dirty="0" err="1" smtClean="0"/>
+              <a:t>pseudolabeled</a:t>
+            </a:r>
+            <a:r>
+              <a:rPr lang="en-US" sz="3200" dirty="0" smtClean="0"/>
+              <a:t> data are mixed in 1:2 – 1:4 proportions respectively.</a:t>
+            </a:r>
+            <a:endParaRPr lang="en-US" sz="3200" dirty="0"/>
           </a:p>
         </p:txBody>
       </p:sp>
     </p:spTree>
     <p:extLst>
       <p:ext uri="{BB962C8B-B14F-4D97-AF65-F5344CB8AC3E}">
-        <p14:creationId xmlns:p14="http://schemas.microsoft.com/office/powerpoint/2010/main" val="1078916155"/>
+        <p14:creationId xmlns:p14="http://schemas.microsoft.com/office/powerpoint/2010/main" val="2934982308"/>
       </p:ext>
     </p:extLst>
   </p:cSld>
@@ -6928,7 +6956,7 @@
       </p:grpSpPr>
       <p:sp>
         <p:nvSpPr>
-          <p:cNvPr id="4" name="Title 3"/>
+          <p:cNvPr id="2" name="Title 1"/>
           <p:cNvSpPr>
             <a:spLocks noGrp="1"/>
           </p:cNvSpPr>
@@ -6942,8 +6970,8 @@
           <a:lstStyle/>
           <a:p>
             <a:r>
-              <a:rPr lang="en-US" dirty="0" smtClean="0"/>
-              <a:t>Summary</a:t>
+              <a:rPr lang="en-US" dirty="0" err="1" smtClean="0"/>
+              <a:t>Pseudolabeling</a:t>
             </a:r>
             <a:endParaRPr lang="en-US" dirty="0"/>
           </a:p>
@@ -6951,99 +6979,23 @@
       </p:sp>
       <p:sp>
         <p:nvSpPr>
-          <p:cNvPr id="5" name="Content Placeholder 4"/>
-          <p:cNvSpPr>
-            <a:spLocks noGrp="1"/>
-          </p:cNvSpPr>
-          <p:nvPr>
-            <p:ph idx="1"/>
-          </p:nvPr>
-        </p:nvSpPr>
-        <p:spPr/>
-        <p:txBody>
-          <a:bodyPr/>
-          <a:lstStyle/>
-          <a:p>
-            <a:pPr marL="514350" indent="-514350">
-              <a:buFont typeface="+mj-lt"/>
-              <a:buAutoNum type="arabicPeriod"/>
-            </a:pPr>
-            <a:r>
-              <a:rPr lang="en-US" dirty="0" smtClean="0"/>
-              <a:t>Train network’s head</a:t>
-            </a:r>
-          </a:p>
-          <a:p>
-            <a:pPr marL="514350" indent="-514350">
-              <a:buFont typeface="+mj-lt"/>
-              <a:buAutoNum type="arabicPeriod"/>
-            </a:pPr>
-            <a:r>
-              <a:rPr lang="en-US" dirty="0" smtClean="0"/>
-              <a:t>Add head to the convolutional part</a:t>
-            </a:r>
-          </a:p>
-          <a:p>
-            <a:pPr marL="514350" indent="-514350">
-              <a:buFont typeface="+mj-lt"/>
-              <a:buAutoNum type="arabicPeriod"/>
-            </a:pPr>
-            <a:r>
-              <a:rPr lang="en-US" dirty="0" smtClean="0"/>
-              <a:t>Add augmentations and learning rate scheduling / CLR</a:t>
-            </a:r>
-          </a:p>
-          <a:p>
-            <a:pPr marL="514350" indent="-514350">
-              <a:buFont typeface="+mj-lt"/>
-              <a:buAutoNum type="arabicPeriod"/>
-            </a:pPr>
-            <a:r>
-              <a:rPr lang="en-US" dirty="0" smtClean="0"/>
-              <a:t>Select appropriate loss</a:t>
-            </a:r>
-          </a:p>
-          <a:p>
-            <a:pPr marL="514350" indent="-514350">
-              <a:buFont typeface="+mj-lt"/>
-              <a:buAutoNum type="arabicPeriod"/>
-            </a:pPr>
-            <a:r>
-              <a:rPr lang="en-US" dirty="0" smtClean="0"/>
-              <a:t>Predict with test-time augmentations</a:t>
-            </a:r>
-          </a:p>
-          <a:p>
-            <a:pPr marL="514350" indent="-514350">
-              <a:buFont typeface="+mj-lt"/>
-              <a:buAutoNum type="arabicPeriod"/>
-            </a:pPr>
-            <a:r>
-              <a:rPr lang="en-US" dirty="0" smtClean="0"/>
-              <a:t>If you don’t have enough training data, apply </a:t>
-            </a:r>
+          <p:cNvPr id="4" name="Text Placeholder 5"/>
+          <p:cNvSpPr>
+            <a:spLocks noGrp="1"/>
+          </p:cNvSpPr>
+          <p:nvPr>
+            <p:ph type="body" idx="1"/>
+          </p:nvPr>
+        </p:nvSpPr>
+        <p:spPr/>
+        <p:txBody>
+          <a:bodyPr/>
+          <a:lstStyle/>
+          <a:p>
             <a:r>
               <a:rPr lang="en-US" dirty="0" err="1" smtClean="0"/>
-              <a:t>pseudolabeling</a:t>
-            </a:r>
-            <a:endParaRPr lang="en-US" dirty="0" smtClean="0"/>
-          </a:p>
-          <a:p>
-            <a:pPr marL="514350" indent="-514350">
-              <a:buFont typeface="+mj-lt"/>
-              <a:buAutoNum type="arabicPeriod"/>
-            </a:pPr>
-            <a:r>
-              <a:rPr lang="en-US" smtClean="0"/>
-              <a:t>Good luck!</a:t>
-            </a:r>
-            <a:endParaRPr lang="en-US" dirty="0" smtClean="0"/>
-          </a:p>
-          <a:p>
-            <a:pPr marL="514350" indent="-514350">
-              <a:buFont typeface="+mj-lt"/>
-              <a:buAutoNum type="arabicPeriod"/>
-            </a:pPr>
+              <a:t>pseudolabeling.ipynb</a:t>
+            </a:r>
             <a:endParaRPr lang="en-US" dirty="0"/>
           </a:p>
         </p:txBody>
@@ -7051,7 +7003,7 @@
     </p:spTree>
     <p:extLst>
       <p:ext uri="{BB962C8B-B14F-4D97-AF65-F5344CB8AC3E}">
-        <p14:creationId xmlns:p14="http://schemas.microsoft.com/office/powerpoint/2010/main" val="2427094357"/>
+        <p14:creationId xmlns:p14="http://schemas.microsoft.com/office/powerpoint/2010/main" val="1078916155"/>
       </p:ext>
     </p:extLst>
   </p:cSld>
@@ -7087,6 +7039,165 @@
       </p:grpSpPr>
       <p:sp>
         <p:nvSpPr>
+          <p:cNvPr id="4" name="Title 3"/>
+          <p:cNvSpPr>
+            <a:spLocks noGrp="1"/>
+          </p:cNvSpPr>
+          <p:nvPr>
+            <p:ph type="title"/>
+          </p:nvPr>
+        </p:nvSpPr>
+        <p:spPr/>
+        <p:txBody>
+          <a:bodyPr/>
+          <a:lstStyle/>
+          <a:p>
+            <a:r>
+              <a:rPr lang="en-US" dirty="0" smtClean="0"/>
+              <a:t>Summary</a:t>
+            </a:r>
+            <a:endParaRPr lang="en-US" dirty="0"/>
+          </a:p>
+        </p:txBody>
+      </p:sp>
+      <p:sp>
+        <p:nvSpPr>
+          <p:cNvPr id="5" name="Content Placeholder 4"/>
+          <p:cNvSpPr>
+            <a:spLocks noGrp="1"/>
+          </p:cNvSpPr>
+          <p:nvPr>
+            <p:ph idx="1"/>
+          </p:nvPr>
+        </p:nvSpPr>
+        <p:spPr/>
+        <p:txBody>
+          <a:bodyPr/>
+          <a:lstStyle/>
+          <a:p>
+            <a:pPr marL="514350" indent="-514350">
+              <a:buFont typeface="+mj-lt"/>
+              <a:buAutoNum type="arabicPeriod"/>
+            </a:pPr>
+            <a:r>
+              <a:rPr lang="en-US" dirty="0" smtClean="0"/>
+              <a:t>Train network’s head</a:t>
+            </a:r>
+          </a:p>
+          <a:p>
+            <a:pPr marL="514350" indent="-514350">
+              <a:buFont typeface="+mj-lt"/>
+              <a:buAutoNum type="arabicPeriod"/>
+            </a:pPr>
+            <a:r>
+              <a:rPr lang="en-US" dirty="0" smtClean="0"/>
+              <a:t>Add head to the convolutional part</a:t>
+            </a:r>
+          </a:p>
+          <a:p>
+            <a:pPr marL="514350" indent="-514350">
+              <a:buFont typeface="+mj-lt"/>
+              <a:buAutoNum type="arabicPeriod"/>
+            </a:pPr>
+            <a:r>
+              <a:rPr lang="en-US" dirty="0" smtClean="0"/>
+              <a:t>Add augmentations and learning rate scheduling / CLR</a:t>
+            </a:r>
+          </a:p>
+          <a:p>
+            <a:pPr marL="514350" indent="-514350">
+              <a:buFont typeface="+mj-lt"/>
+              <a:buAutoNum type="arabicPeriod"/>
+            </a:pPr>
+            <a:r>
+              <a:rPr lang="en-US" dirty="0" smtClean="0"/>
+              <a:t>Select appropriate loss</a:t>
+            </a:r>
+          </a:p>
+          <a:p>
+            <a:pPr marL="514350" indent="-514350">
+              <a:buFont typeface="+mj-lt"/>
+              <a:buAutoNum type="arabicPeriod"/>
+            </a:pPr>
+            <a:r>
+              <a:rPr lang="en-US" dirty="0" smtClean="0"/>
+              <a:t>Predict with test-time augmentations</a:t>
+            </a:r>
+          </a:p>
+          <a:p>
+            <a:pPr marL="514350" indent="-514350">
+              <a:buFont typeface="+mj-lt"/>
+              <a:buAutoNum type="arabicPeriod"/>
+            </a:pPr>
+            <a:r>
+              <a:rPr lang="en-US" dirty="0" smtClean="0"/>
+              <a:t>If you don’t have enough training data, apply </a:t>
+            </a:r>
+            <a:r>
+              <a:rPr lang="en-US" dirty="0" err="1" smtClean="0"/>
+              <a:t>pseudolabeling</a:t>
+            </a:r>
+            <a:endParaRPr lang="en-US" dirty="0" smtClean="0"/>
+          </a:p>
+          <a:p>
+            <a:pPr marL="514350" indent="-514350">
+              <a:buFont typeface="+mj-lt"/>
+              <a:buAutoNum type="arabicPeriod"/>
+            </a:pPr>
+            <a:r>
+              <a:rPr lang="en-US" smtClean="0"/>
+              <a:t>Good luck!</a:t>
+            </a:r>
+            <a:endParaRPr lang="en-US" dirty="0" smtClean="0"/>
+          </a:p>
+          <a:p>
+            <a:pPr marL="514350" indent="-514350">
+              <a:buFont typeface="+mj-lt"/>
+              <a:buAutoNum type="arabicPeriod"/>
+            </a:pPr>
+            <a:endParaRPr lang="en-US" dirty="0"/>
+          </a:p>
+        </p:txBody>
+      </p:sp>
+    </p:spTree>
+    <p:extLst>
+      <p:ext uri="{BB962C8B-B14F-4D97-AF65-F5344CB8AC3E}">
+        <p14:creationId xmlns:p14="http://schemas.microsoft.com/office/powerpoint/2010/main" val="2427094357"/>
+      </p:ext>
+    </p:extLst>
+  </p:cSld>
+  <p:clrMapOvr>
+    <a:masterClrMapping/>
+  </p:clrMapOvr>
+  <p:timing>
+    <p:tnLst>
+      <p:par>
+        <p:cTn id="1" dur="indefinite" restart="never" nodeType="tmRoot"/>
+      </p:par>
+    </p:tnLst>
+  </p:timing>
+</p:sld>
+</file>
+
+<file path=ppt/slides/slide34.xml><?xml version="1.0" encoding="utf-8"?>
+<p:sld xmlns:a="http://schemas.openxmlformats.org/drawingml/2006/main" xmlns:r="http://schemas.openxmlformats.org/officeDocument/2006/relationships" xmlns:p="http://schemas.openxmlformats.org/presentationml/2006/main">
+  <p:cSld>
+    <p:spTree>
+      <p:nvGrpSpPr>
+        <p:cNvPr id="1" name=""/>
+        <p:cNvGrpSpPr/>
+        <p:nvPr/>
+      </p:nvGrpSpPr>
+      <p:grpSpPr>
+        <a:xfrm>
+          <a:off x="0" y="0"/>
+          <a:ext cx="0" cy="0"/>
+          <a:chOff x="0" y="0"/>
+          <a:chExt cx="0" cy="0"/>
+        </a:xfrm>
+      </p:grpSpPr>
+      <p:sp>
+        <p:nvSpPr>
           <p:cNvPr id="2" name="Title 1"/>
           <p:cNvSpPr>
             <a:spLocks noGrp="1"/>
@@ -7127,8 +7238,13 @@
           <a:p>
             <a:r>
               <a:rPr lang="en-US" sz="3600" dirty="0" smtClean="0"/>
-              <a:t>How to select network architecture (size, regularization, pooling type, classifier structure)?</a:t>
-            </a:r>
+              <a:t>How to select network architecture (size, regularization, pooling type, classifier structure</a:t>
+            </a:r>
+            <a:r>
+              <a:rPr lang="en-US" sz="3600" dirty="0" smtClean="0"/>
+              <a:t>)</a:t>
+            </a:r>
+            <a:endParaRPr lang="en-US" sz="3600" dirty="0" smtClean="0"/>
           </a:p>
           <a:p>
             <a:r>
@@ -7141,14 +7257,24 @@
             </a:r>
             <a:r>
               <a:rPr lang="en-US" sz="3600" dirty="0" smtClean="0"/>
-              <a:t>, etc.)?</a:t>
-            </a:r>
-          </a:p>
-          <a:p>
+              <a:t>, etc</a:t>
+            </a:r>
             <a:r>
               <a:rPr lang="en-US" sz="3600" dirty="0" smtClean="0"/>
-              <a:t>Training on the bigger resolution.</a:t>
-            </a:r>
+              <a:t>.)</a:t>
+            </a:r>
+            <a:endParaRPr lang="en-US" sz="3600" dirty="0" smtClean="0"/>
+          </a:p>
+          <a:p>
+            <a:r>
+              <a:rPr lang="en-US" sz="3600" dirty="0" smtClean="0"/>
+              <a:t>Training on the bigger </a:t>
+            </a:r>
+            <a:r>
+              <a:rPr lang="en-US" sz="3600" dirty="0" smtClean="0"/>
+              <a:t>resolution</a:t>
+            </a:r>
+            <a:endParaRPr lang="en-US" sz="3600" dirty="0" smtClean="0"/>
           </a:p>
           <a:p>
             <a:r>
@@ -7157,8 +7283,13 @@
             </a:r>
             <a:r>
               <a:rPr lang="en-US" sz="3600" dirty="0" smtClean="0"/>
-              <a:t> of CNN.</a:t>
-            </a:r>
+              <a:t> of </a:t>
+            </a:r>
+            <a:r>
+              <a:rPr lang="en-US" sz="3600" dirty="0" smtClean="0"/>
+              <a:t>CNN</a:t>
+            </a:r>
+            <a:endParaRPr lang="en-US" sz="3600" dirty="0" smtClean="0"/>
           </a:p>
         </p:txBody>
       </p:sp>
@@ -7182,7 +7313,7 @@
 </p:sld>
 </file>
 
-<file path=ppt/slides/slide34.xml><?xml version="1.0" encoding="utf-8"?>
+<file path=ppt/slides/slide35.xml><?xml version="1.0" encoding="utf-8"?>
 <p:sld xmlns:a="http://schemas.openxmlformats.org/drawingml/2006/main" xmlns:r="http://schemas.openxmlformats.org/officeDocument/2006/relationships" xmlns:p="http://schemas.openxmlformats.org/presentationml/2006/main">
   <p:cSld>
     <p:spTree>
@@ -7371,7 +7502,153 @@
       </p:grpSpPr>
       <p:pic>
         <p:nvPicPr>
-          <p:cNvPr id="4" name="Picture 3"/>
+          <p:cNvPr id="5" name="Picture 4"/>
+          <p:cNvPicPr>
+            <a:picLocks noChangeAspect="1"/>
+          </p:cNvPicPr>
+          <p:nvPr/>
+        </p:nvPicPr>
+        <p:blipFill>
+          <a:blip r:embed="rId2">
+            <a:extLst>
+              <a:ext uri="{28A0092B-C50C-407E-A947-70E740481C1C}">
+                <a14:useLocalDpi xmlns:a14="http://schemas.microsoft.com/office/drawing/2010/main" val="0"/>
+              </a:ext>
+            </a:extLst>
+          </a:blip>
+          <a:stretch>
+            <a:fillRect/>
+          </a:stretch>
+        </p:blipFill>
+        <p:spPr>
+          <a:xfrm>
+            <a:off x="4413600" y="1825625"/>
+            <a:ext cx="7620000" cy="3810000"/>
+          </a:xfrm>
+          <a:prstGeom prst="rect">
+            <a:avLst/>
+          </a:prstGeom>
+        </p:spPr>
+      </p:pic>
+      <p:sp>
+        <p:nvSpPr>
+          <p:cNvPr id="2" name="Title 1"/>
+          <p:cNvSpPr>
+            <a:spLocks noGrp="1"/>
+          </p:cNvSpPr>
+          <p:nvPr>
+            <p:ph type="title"/>
+          </p:nvPr>
+        </p:nvSpPr>
+        <p:spPr/>
+        <p:txBody>
+          <a:bodyPr/>
+          <a:lstStyle/>
+          <a:p>
+            <a:r>
+              <a:rPr lang="en-US" dirty="0" smtClean="0"/>
+              <a:t>Exploratory data analysis</a:t>
+            </a:r>
+            <a:endParaRPr lang="en-US" dirty="0"/>
+          </a:p>
+        </p:txBody>
+      </p:sp>
+      <p:sp>
+        <p:nvSpPr>
+          <p:cNvPr id="3" name="Content Placeholder 2"/>
+          <p:cNvSpPr>
+            <a:spLocks noGrp="1"/>
+          </p:cNvSpPr>
+          <p:nvPr>
+            <p:ph idx="1"/>
+          </p:nvPr>
+        </p:nvSpPr>
+        <p:spPr>
+          <a:xfrm>
+            <a:off x="838199" y="1825625"/>
+            <a:ext cx="3860557" cy="4351338"/>
+          </a:xfrm>
+        </p:spPr>
+        <p:txBody>
+          <a:bodyPr>
+            <a:normAutofit/>
+          </a:bodyPr>
+          <a:lstStyle/>
+          <a:p>
+            <a:r>
+              <a:rPr lang="en-US" dirty="0" smtClean="0"/>
+              <a:t>Real-world images of various goods.</a:t>
+            </a:r>
+          </a:p>
+          <a:p>
+            <a:r>
+              <a:rPr lang="en-US" dirty="0" smtClean="0"/>
+              <a:t>Different occlusions, illumination, etc.</a:t>
+            </a:r>
+          </a:p>
+          <a:p>
+            <a:r>
+              <a:rPr lang="en-US" dirty="0" smtClean="0"/>
+              <a:t>Most of items are centered on the picture.</a:t>
+            </a:r>
+          </a:p>
+          <a:p>
+            <a:r>
+              <a:rPr lang="en-US" dirty="0" smtClean="0"/>
+              <a:t>There are extremely close classes.</a:t>
+            </a:r>
+            <a:endParaRPr lang="en-US" dirty="0"/>
+          </a:p>
+        </p:txBody>
+      </p:sp>
+    </p:spTree>
+    <p:extLst>
+      <p:ext uri="{BB962C8B-B14F-4D97-AF65-F5344CB8AC3E}">
+        <p14:creationId xmlns:p14="http://schemas.microsoft.com/office/powerpoint/2010/main" val="1903036322"/>
+      </p:ext>
+    </p:extLst>
+  </p:cSld>
+  <p:clrMapOvr>
+    <a:masterClrMapping/>
+  </p:clrMapOvr>
+  <mc:AlternateContent xmlns:mc="http://schemas.openxmlformats.org/markup-compatibility/2006" xmlns:p14="http://schemas.microsoft.com/office/powerpoint/2010/main">
+    <mc:Choice Requires="p14">
+      <p:transition p14:dur="0"/>
+    </mc:Choice>
+    <mc:Fallback xmlns="">
+      <p:transition/>
+    </mc:Fallback>
+  </mc:AlternateContent>
+  <p:timing>
+    <p:tnLst>
+      <p:par>
+        <p:cTn id="1" dur="indefinite" restart="never" nodeType="tmRoot"/>
+      </p:par>
+    </p:tnLst>
+  </p:timing>
+</p:sld>
+</file>
+
+<file path=ppt/slides/slide6.xml><?xml version="1.0" encoding="utf-8"?>
+<p:sld xmlns:a="http://schemas.openxmlformats.org/drawingml/2006/main" xmlns:r="http://schemas.openxmlformats.org/officeDocument/2006/relationships" xmlns:p="http://schemas.openxmlformats.org/presentationml/2006/main">
+  <p:cSld>
+    <p:spTree>
+      <p:nvGrpSpPr>
+        <p:cNvPr id="1" name=""/>
+        <p:cNvGrpSpPr/>
+        <p:nvPr/>
+      </p:nvGrpSpPr>
+      <p:grpSpPr>
+        <a:xfrm>
+          <a:off x="0" y="0"/>
+          <a:ext cx="0" cy="0"/>
+          <a:chOff x="0" y="0"/>
+          <a:chExt cx="0" cy="0"/>
+        </a:xfrm>
+      </p:grpSpPr>
+      <p:pic>
+        <p:nvPicPr>
+          <p:cNvPr id="5" name="Picture 4"/>
           <p:cNvPicPr>
             <a:picLocks noChangeAspect="1"/>
           </p:cNvPicPr>
@@ -7399,9 +7676,37 @@
           </a:prstGeom>
         </p:spPr>
       </p:pic>
+      <p:sp>
+        <p:nvSpPr>
+          <p:cNvPr id="6" name="Title 1"/>
+          <p:cNvSpPr>
+            <a:spLocks noGrp="1"/>
+          </p:cNvSpPr>
+          <p:nvPr>
+            <p:ph type="title"/>
+          </p:nvPr>
+        </p:nvSpPr>
+        <p:spPr>
+          <a:xfrm>
+            <a:off x="838200" y="365125"/>
+            <a:ext cx="10515600" cy="1325563"/>
+          </a:xfrm>
+        </p:spPr>
+        <p:txBody>
+          <a:bodyPr/>
+          <a:lstStyle/>
+          <a:p>
+            <a:r>
+              <a:rPr lang="en-US" dirty="0" smtClean="0"/>
+              <a:t>Exploratory data analysis</a:t>
+            </a:r>
+            <a:endParaRPr lang="en-US" dirty="0"/>
+          </a:p>
+        </p:txBody>
+      </p:sp>
       <p:pic>
         <p:nvPicPr>
-          <p:cNvPr id="5" name="Picture 4"/>
+          <p:cNvPr id="7" name="Picture 6"/>
           <p:cNvPicPr>
             <a:picLocks noChangeAspect="1"/>
           </p:cNvPicPr>
@@ -7421,182 +7726,35 @@
         </p:blipFill>
         <p:spPr>
           <a:xfrm>
-            <a:off x="4413738" y="1825625"/>
-            <a:ext cx="7620000" cy="3810000"/>
+            <a:off x="406400" y="2206843"/>
+            <a:ext cx="3855797" cy="3048650"/>
           </a:xfrm>
           <a:prstGeom prst="rect">
             <a:avLst/>
           </a:prstGeom>
         </p:spPr>
       </p:pic>
-      <p:sp>
-        <p:nvSpPr>
-          <p:cNvPr id="2" name="Title 1"/>
-          <p:cNvSpPr>
-            <a:spLocks noGrp="1"/>
-          </p:cNvSpPr>
-          <p:nvPr>
-            <p:ph type="title"/>
-          </p:nvPr>
-        </p:nvSpPr>
-        <p:spPr/>
-        <p:txBody>
-          <a:bodyPr/>
-          <a:lstStyle/>
-          <a:p>
-            <a:r>
-              <a:rPr lang="en-US" dirty="0" smtClean="0"/>
-              <a:t>Exploratory data analysis</a:t>
-            </a:r>
-            <a:endParaRPr lang="en-US" dirty="0"/>
-          </a:p>
-        </p:txBody>
-      </p:sp>
-      <p:sp>
-        <p:nvSpPr>
-          <p:cNvPr id="3" name="Content Placeholder 2"/>
-          <p:cNvSpPr>
-            <a:spLocks noGrp="1"/>
-          </p:cNvSpPr>
-          <p:nvPr>
-            <p:ph idx="1"/>
-          </p:nvPr>
-        </p:nvSpPr>
-        <p:spPr>
-          <a:xfrm>
-            <a:off x="838199" y="1825625"/>
-            <a:ext cx="3860557" cy="4351338"/>
-          </a:xfrm>
-        </p:spPr>
-        <p:txBody>
-          <a:bodyPr>
-            <a:normAutofit/>
-          </a:bodyPr>
-          <a:lstStyle/>
-          <a:p>
-            <a:r>
-              <a:rPr lang="en-US" dirty="0" smtClean="0"/>
-              <a:t>Real-world images of various goods.</a:t>
-            </a:r>
-          </a:p>
-          <a:p>
-            <a:r>
-              <a:rPr lang="en-US" dirty="0" smtClean="0"/>
-              <a:t>Different occlusions, illumination, etc.</a:t>
-            </a:r>
-          </a:p>
-          <a:p>
-            <a:r>
-              <a:rPr lang="en-US" dirty="0" smtClean="0"/>
-              <a:t>Most of items are centered on the picture.</a:t>
-            </a:r>
-          </a:p>
-          <a:p>
-            <a:r>
-              <a:rPr lang="en-US" dirty="0" smtClean="0"/>
-              <a:t>There are extremely close classes.</a:t>
-            </a:r>
-            <a:endParaRPr lang="en-US" dirty="0"/>
-          </a:p>
-        </p:txBody>
-      </p:sp>
     </p:spTree>
     <p:extLst>
       <p:ext uri="{BB962C8B-B14F-4D97-AF65-F5344CB8AC3E}">
-        <p14:creationId xmlns:p14="http://schemas.microsoft.com/office/powerpoint/2010/main" val="1903036322"/>
+        <p14:creationId xmlns:p14="http://schemas.microsoft.com/office/powerpoint/2010/main" val="1094432476"/>
       </p:ext>
     </p:extLst>
   </p:cSld>
   <p:clrMapOvr>
     <a:masterClrMapping/>
   </p:clrMapOvr>
-  <mc:AlternateContent xmlns:mc="http://schemas.openxmlformats.org/markup-compatibility/2006" xmlns:p14="http://schemas.microsoft.com/office/powerpoint/2010/main">
-    <mc:Choice Requires="p14">
-      <p:transition p14:dur="0"/>
-    </mc:Choice>
-    <mc:Fallback xmlns="">
-      <p:transition/>
-    </mc:Fallback>
-  </mc:AlternateContent>
   <p:timing>
     <p:tnLst>
       <p:par>
-        <p:cTn id="1" dur="indefinite" restart="never" nodeType="tmRoot">
-          <p:childTnLst>
-            <p:seq concurrent="1" nextAc="seek">
-              <p:cTn id="2" dur="indefinite" nodeType="mainSeq">
-                <p:childTnLst>
-                  <p:par>
-                    <p:cTn id="3" fill="hold">
-                      <p:stCondLst>
-                        <p:cond delay="indefinite"/>
-                      </p:stCondLst>
-                      <p:childTnLst>
-                        <p:par>
-                          <p:cTn id="4" fill="hold">
-                            <p:stCondLst>
-                              <p:cond delay="0"/>
-                            </p:stCondLst>
-                            <p:childTnLst>
-                              <p:par>
-                                <p:cTn id="5" presetID="1" presetClass="exit" presetSubtype="0" fill="hold" nodeType="clickEffect">
-                                  <p:stCondLst>
-                                    <p:cond delay="0"/>
-                                  </p:stCondLst>
-                                  <p:childTnLst>
-                                    <p:set>
-                                      <p:cBhvr>
-                                        <p:cTn id="6" dur="1" fill="hold">
-                                          <p:stCondLst>
-                                            <p:cond delay="0"/>
-                                          </p:stCondLst>
-                                        </p:cTn>
-                                        <p:tgtEl>
-                                          <p:spTgt spid="5"/>
-                                        </p:tgtEl>
-                                        <p:attrNameLst>
-                                          <p:attrName>style.visibility</p:attrName>
-                                        </p:attrNameLst>
-                                      </p:cBhvr>
-                                      <p:to>
-                                        <p:strVal val="hidden"/>
-                                      </p:to>
-                                    </p:set>
-                                  </p:childTnLst>
-                                </p:cTn>
-                              </p:par>
-                            </p:childTnLst>
-                          </p:cTn>
-                        </p:par>
-                      </p:childTnLst>
-                    </p:cTn>
-                  </p:par>
-                </p:childTnLst>
-              </p:cTn>
-              <p:prevCondLst>
-                <p:cond evt="onPrev" delay="0">
-                  <p:tgtEl>
-                    <p:sldTgt/>
-                  </p:tgtEl>
-                </p:cond>
-              </p:prevCondLst>
-              <p:nextCondLst>
-                <p:cond evt="onNext" delay="0">
-                  <p:tgtEl>
-                    <p:sldTgt/>
-                  </p:tgtEl>
-                </p:cond>
-              </p:nextCondLst>
-            </p:seq>
-          </p:childTnLst>
-        </p:cTn>
+        <p:cTn id="1" dur="indefinite" restart="never" nodeType="tmRoot"/>
       </p:par>
     </p:tnLst>
   </p:timing>
 </p:sld>
 </file>
 
-<file path=ppt/slides/slide6.xml><?xml version="1.0" encoding="utf-8"?>
+<file path=ppt/slides/slide7.xml><?xml version="1.0" encoding="utf-8"?>
 <p:sld xmlns:a="http://schemas.openxmlformats.org/drawingml/2006/main" xmlns:r="http://schemas.openxmlformats.org/officeDocument/2006/relationships" xmlns:p="http://schemas.openxmlformats.org/presentationml/2006/main">
   <p:cSld>
     <p:spTree>
@@ -7750,7 +7908,7 @@
 </p:sld>
 </file>
 
-<file path=ppt/slides/slide7.xml><?xml version="1.0" encoding="utf-8"?>
+<file path=ppt/slides/slide8.xml><?xml version="1.0" encoding="utf-8"?>
 <p:sld xmlns:a="http://schemas.openxmlformats.org/drawingml/2006/main" xmlns:r="http://schemas.openxmlformats.org/officeDocument/2006/relationships" xmlns:p="http://schemas.openxmlformats.org/presentationml/2006/main">
   <p:cSld>
     <p:spTree>
@@ -7873,7 +8031,7 @@
 </p:sld>
 </file>
 
-<file path=ppt/slides/slide8.xml><?xml version="1.0" encoding="utf-8"?>
+<file path=ppt/slides/slide9.xml><?xml version="1.0" encoding="utf-8"?>
 <p:sld xmlns:a="http://schemas.openxmlformats.org/drawingml/2006/main" xmlns:r="http://schemas.openxmlformats.org/officeDocument/2006/relationships" xmlns:p="http://schemas.openxmlformats.org/presentationml/2006/main">
   <p:cSld>
     <p:spTree>
@@ -8141,93 +8299,6 @@
     <p:extLst>
       <p:ext uri="{BB962C8B-B14F-4D97-AF65-F5344CB8AC3E}">
         <p14:creationId xmlns:p14="http://schemas.microsoft.com/office/powerpoint/2010/main" val="1033762662"/>
-      </p:ext>
-    </p:extLst>
-  </p:cSld>
-  <p:clrMapOvr>
-    <a:masterClrMapping/>
-  </p:clrMapOvr>
-  <p:timing>
-    <p:tnLst>
-      <p:par>
-        <p:cTn id="1" dur="indefinite" restart="never" nodeType="tmRoot"/>
-      </p:par>
-    </p:tnLst>
-  </p:timing>
-</p:sld>
-</file>
-
-<file path=ppt/slides/slide9.xml><?xml version="1.0" encoding="utf-8"?>
-<p:sld xmlns:a="http://schemas.openxmlformats.org/drawingml/2006/main" xmlns:r="http://schemas.openxmlformats.org/officeDocument/2006/relationships" xmlns:p="http://schemas.openxmlformats.org/presentationml/2006/main">
-  <p:cSld>
-    <p:spTree>
-      <p:nvGrpSpPr>
-        <p:cNvPr id="1" name=""/>
-        <p:cNvGrpSpPr/>
-        <p:nvPr/>
-      </p:nvGrpSpPr>
-      <p:grpSpPr>
-        <a:xfrm>
-          <a:off x="0" y="0"/>
-          <a:ext cx="0" cy="0"/>
-          <a:chOff x="0" y="0"/>
-          <a:chExt cx="0" cy="0"/>
-        </a:xfrm>
-      </p:grpSpPr>
-      <p:sp>
-        <p:nvSpPr>
-          <p:cNvPr id="4" name="Title 3"/>
-          <p:cNvSpPr>
-            <a:spLocks noGrp="1"/>
-          </p:cNvSpPr>
-          <p:nvPr>
-            <p:ph type="title"/>
-          </p:nvPr>
-        </p:nvSpPr>
-        <p:spPr/>
-        <p:txBody>
-          <a:bodyPr/>
-          <a:lstStyle/>
-          <a:p>
-            <a:r>
-              <a:rPr lang="en-US" dirty="0" smtClean="0"/>
-              <a:t>Fine-tuning pre-trained CNN</a:t>
-            </a:r>
-            <a:endParaRPr lang="en-US" dirty="0"/>
-          </a:p>
-        </p:txBody>
-      </p:sp>
-      <p:sp>
-        <p:nvSpPr>
-          <p:cNvPr id="5" name="Text Placeholder 4"/>
-          <p:cNvSpPr>
-            <a:spLocks noGrp="1"/>
-          </p:cNvSpPr>
-          <p:nvPr>
-            <p:ph type="body" idx="1"/>
-          </p:nvPr>
-        </p:nvSpPr>
-        <p:spPr/>
-        <p:txBody>
-          <a:bodyPr/>
-          <a:lstStyle/>
-          <a:p>
-            <a:r>
-              <a:rPr lang="en-US" dirty="0" smtClean="0"/>
-              <a:t>fine-</a:t>
-            </a:r>
-            <a:r>
-              <a:rPr lang="en-US" dirty="0" err="1" smtClean="0"/>
-              <a:t>tuning.ipynb</a:t>
-            </a:r>
-            <a:endParaRPr lang="en-US" dirty="0"/>
-          </a:p>
-        </p:txBody>
-      </p:sp>
-    </p:spTree>
-    <p:extLst>
-      <p:ext uri="{BB962C8B-B14F-4D97-AF65-F5344CB8AC3E}">
-        <p14:creationId xmlns:p14="http://schemas.microsoft.com/office/powerpoint/2010/main" val="49459154"/>
       </p:ext>
     </p:extLst>
   </p:cSld>

</xml_diff>

<commit_message>
Fixed mistake on the slide
</commit_message>
<xml_diff>
--- a/cnn-tips-and-tricks.pptx
+++ b/cnn-tips-and-tricks.pptx
@@ -279,7 +279,7 @@
           <a:p>
             <a:fld id="{A122AF52-36FB-473A-95B1-935522EDF6B5}" type="datetimeFigureOut">
               <a:rPr lang="en-US" smtClean="0"/>
-              <a:t>9/24/2018</a:t>
+              <a:t>10/1/2018</a:t>
             </a:fld>
             <a:endParaRPr lang="en-US"/>
           </a:p>
@@ -449,7 +449,7 @@
           <a:p>
             <a:fld id="{A122AF52-36FB-473A-95B1-935522EDF6B5}" type="datetimeFigureOut">
               <a:rPr lang="en-US" smtClean="0"/>
-              <a:t>9/24/2018</a:t>
+              <a:t>10/1/2018</a:t>
             </a:fld>
             <a:endParaRPr lang="en-US"/>
           </a:p>
@@ -629,7 +629,7 @@
           <a:p>
             <a:fld id="{A122AF52-36FB-473A-95B1-935522EDF6B5}" type="datetimeFigureOut">
               <a:rPr lang="en-US" smtClean="0"/>
-              <a:t>9/24/2018</a:t>
+              <a:t>10/1/2018</a:t>
             </a:fld>
             <a:endParaRPr lang="en-US"/>
           </a:p>
@@ -799,7 +799,7 @@
           <a:p>
             <a:fld id="{A122AF52-36FB-473A-95B1-935522EDF6B5}" type="datetimeFigureOut">
               <a:rPr lang="en-US" smtClean="0"/>
-              <a:t>9/24/2018</a:t>
+              <a:t>10/1/2018</a:t>
             </a:fld>
             <a:endParaRPr lang="en-US"/>
           </a:p>
@@ -1045,7 +1045,7 @@
           <a:p>
             <a:fld id="{A122AF52-36FB-473A-95B1-935522EDF6B5}" type="datetimeFigureOut">
               <a:rPr lang="en-US" smtClean="0"/>
-              <a:t>9/24/2018</a:t>
+              <a:t>10/1/2018</a:t>
             </a:fld>
             <a:endParaRPr lang="en-US"/>
           </a:p>
@@ -1277,7 +1277,7 @@
           <a:p>
             <a:fld id="{A122AF52-36FB-473A-95B1-935522EDF6B5}" type="datetimeFigureOut">
               <a:rPr lang="en-US" smtClean="0"/>
-              <a:t>9/24/2018</a:t>
+              <a:t>10/1/2018</a:t>
             </a:fld>
             <a:endParaRPr lang="en-US"/>
           </a:p>
@@ -1644,7 +1644,7 @@
           <a:p>
             <a:fld id="{A122AF52-36FB-473A-95B1-935522EDF6B5}" type="datetimeFigureOut">
               <a:rPr lang="en-US" smtClean="0"/>
-              <a:t>9/24/2018</a:t>
+              <a:t>10/1/2018</a:t>
             </a:fld>
             <a:endParaRPr lang="en-US"/>
           </a:p>
@@ -1762,7 +1762,7 @@
           <a:p>
             <a:fld id="{A122AF52-36FB-473A-95B1-935522EDF6B5}" type="datetimeFigureOut">
               <a:rPr lang="en-US" smtClean="0"/>
-              <a:t>9/24/2018</a:t>
+              <a:t>10/1/2018</a:t>
             </a:fld>
             <a:endParaRPr lang="en-US"/>
           </a:p>
@@ -1857,7 +1857,7 @@
           <a:p>
             <a:fld id="{A122AF52-36FB-473A-95B1-935522EDF6B5}" type="datetimeFigureOut">
               <a:rPr lang="en-US" smtClean="0"/>
-              <a:t>9/24/2018</a:t>
+              <a:t>10/1/2018</a:t>
             </a:fld>
             <a:endParaRPr lang="en-US"/>
           </a:p>
@@ -2134,7 +2134,7 @@
           <a:p>
             <a:fld id="{A122AF52-36FB-473A-95B1-935522EDF6B5}" type="datetimeFigureOut">
               <a:rPr lang="en-US" smtClean="0"/>
-              <a:t>9/24/2018</a:t>
+              <a:t>10/1/2018</a:t>
             </a:fld>
             <a:endParaRPr lang="en-US"/>
           </a:p>
@@ -2387,7 +2387,7 @@
           <a:p>
             <a:fld id="{A122AF52-36FB-473A-95B1-935522EDF6B5}" type="datetimeFigureOut">
               <a:rPr lang="en-US" smtClean="0"/>
-              <a:t>9/24/2018</a:t>
+              <a:t>10/1/2018</a:t>
             </a:fld>
             <a:endParaRPr lang="en-US"/>
           </a:p>
@@ -2600,7 +2600,7 @@
           <a:p>
             <a:fld id="{A122AF52-36FB-473A-95B1-935522EDF6B5}" type="datetimeFigureOut">
               <a:rPr lang="en-US" smtClean="0"/>
-              <a:t>9/24/2018</a:t>
+              <a:t>10/1/2018</a:t>
             </a:fld>
             <a:endParaRPr lang="en-US"/>
           </a:p>
@@ -7710,8 +7710,27 @@
           <a:p>
             <a:r>
               <a:rPr lang="en-US" sz="3600" dirty="0" smtClean="0"/>
-              <a:t> Negative samples mining</a:t>
-            </a:r>
+              <a:t> </a:t>
+            </a:r>
+            <a:r>
+              <a:rPr lang="en-US" sz="3600" dirty="0" smtClean="0"/>
+              <a:t>Hard </a:t>
+            </a:r>
+            <a:r>
+              <a:rPr lang="en-US" sz="3600" dirty="0" smtClean="0"/>
+              <a:t>samples </a:t>
+            </a:r>
+            <a:r>
+              <a:rPr lang="en-US" sz="3600" dirty="0" smtClean="0"/>
+              <a:t>mining</a:t>
+            </a:r>
+          </a:p>
+          <a:p>
+            <a:r>
+              <a:rPr lang="en-US" sz="3600" dirty="0" err="1" smtClean="0"/>
+              <a:t>Ensembling</a:t>
+            </a:r>
+            <a:endParaRPr lang="en-US" sz="3600" dirty="0" smtClean="0"/>
           </a:p>
         </p:txBody>
       </p:sp>

</xml_diff>